<commit_message>
fixing archive on io
</commit_message>
<xml_diff>
--- a/samples/pptx/sample.pptx
+++ b/samples/pptx/sample.pptx
@@ -348,7 +348,7 @@
             <a:fld id="{B6F15528-21DE-4FAA-801E-634DDDAF4B2B}" type="slidenum">
               <a:rPr lang="en-US" smtClean="0"/>
               <a:pPr/>
-              <a:t>9#:</a:t>
+              <a:t>‹#›</a:t>
             </a:fld>
             <a:endParaRPr lang="en-US"/>
           </a:p>
@@ -515,7 +515,7 @@
             <a:fld id="{B6F15528-21DE-4FAA-801E-634DDDAF4B2B}" type="slidenum">
               <a:rPr lang="en-US" smtClean="0"/>
               <a:pPr/>
-              <a:t>9#:</a:t>
+              <a:t>‹#›</a:t>
             </a:fld>
             <a:endParaRPr lang="en-US"/>
           </a:p>
@@ -692,7 +692,7 @@
             <a:fld id="{B6F15528-21DE-4FAA-801E-634DDDAF4B2B}" type="slidenum">
               <a:rPr lang="en-US" smtClean="0"/>
               <a:pPr/>
-              <a:t>9#:</a:t>
+              <a:t>‹#›</a:t>
             </a:fld>
             <a:endParaRPr lang="en-US"/>
           </a:p>
@@ -859,7 +859,7 @@
             <a:fld id="{B6F15528-21DE-4FAA-801E-634DDDAF4B2B}" type="slidenum">
               <a:rPr lang="en-US" smtClean="0"/>
               <a:pPr/>
-              <a:t>9#:</a:t>
+              <a:t>‹#›</a:t>
             </a:fld>
             <a:endParaRPr lang="en-US"/>
           </a:p>
@@ -1102,7 +1102,7 @@
             <a:fld id="{B6F15528-21DE-4FAA-801E-634DDDAF4B2B}" type="slidenum">
               <a:rPr lang="en-US" smtClean="0"/>
               <a:pPr/>
-              <a:t>9#:</a:t>
+              <a:t>‹#›</a:t>
             </a:fld>
             <a:endParaRPr lang="en-US"/>
           </a:p>
@@ -1387,7 +1387,7 @@
             <a:fld id="{B6F15528-21DE-4FAA-801E-634DDDAF4B2B}" type="slidenum">
               <a:rPr lang="en-US" smtClean="0"/>
               <a:pPr/>
-              <a:t>9#:</a:t>
+              <a:t>‹#›</a:t>
             </a:fld>
             <a:endParaRPr lang="en-US"/>
           </a:p>
@@ -1806,7 +1806,7 @@
             <a:fld id="{B6F15528-21DE-4FAA-801E-634DDDAF4B2B}" type="slidenum">
               <a:rPr lang="en-US" smtClean="0"/>
               <a:pPr/>
-              <a:t>9#:</a:t>
+              <a:t>‹#›</a:t>
             </a:fld>
             <a:endParaRPr lang="en-US"/>
           </a:p>
@@ -1921,7 +1921,7 @@
             <a:fld id="{B6F15528-21DE-4FAA-801E-634DDDAF4B2B}" type="slidenum">
               <a:rPr lang="en-US" smtClean="0"/>
               <a:pPr/>
-              <a:t>9#:</a:t>
+              <a:t>‹#›</a:t>
             </a:fld>
             <a:endParaRPr lang="en-US"/>
           </a:p>
@@ -2013,7 +2013,7 @@
             <a:fld id="{B6F15528-21DE-4FAA-801E-634DDDAF4B2B}" type="slidenum">
               <a:rPr lang="en-US" smtClean="0"/>
               <a:pPr/>
-              <a:t>9#:</a:t>
+              <a:t>‹#›</a:t>
             </a:fld>
             <a:endParaRPr lang="en-US"/>
           </a:p>
@@ -2287,7 +2287,7 @@
             <a:fld id="{B6F15528-21DE-4FAA-801E-634DDDAF4B2B}" type="slidenum">
               <a:rPr lang="en-US" smtClean="0"/>
               <a:pPr/>
-              <a:t>9#:</a:t>
+              <a:t>‹#›</a:t>
             </a:fld>
             <a:endParaRPr lang="en-US"/>
           </a:p>
@@ -2537,7 +2537,7 @@
             <a:fld id="{B6F15528-21DE-4FAA-801E-634DDDAF4B2B}" type="slidenum">
               <a:rPr lang="en-US" smtClean="0"/>
               <a:pPr/>
-              <a:t>9#:</a:t>
+              <a:t>‹#›</a:t>
             </a:fld>
             <a:endParaRPr lang="en-US"/>
           </a:p>
@@ -2551,7 +2551,7 @@
 </p:sldLayout>
 </file>
 
-<file path=ppt/slideMasters/slideMaster1.xml><?xml version="1.0" encoding="UTF-8" standalone="yes"?>
+<file path=ppt/slideMasters/slideMaster1.xml><?xml version="1.0" encoding="utf-8"?>
 <p:sldMaster xmlns:a="http://schemas.openxmlformats.org/drawingml/2006/main" xmlns:p="http://schemas.openxmlformats.org/presentationml/2006/main" xmlns:r="http://schemas.openxmlformats.org/officeDocument/2006/relationships">
   <p:cSld>
     <p:bg>
@@ -2783,7 +2783,7 @@
             <a:fld id="{B6F15528-21DE-4FAA-801E-634DDDAF4B2B}" type="slidenum">
               <a:rPr lang="en-US" smtClean="0"/>
               <a:pPr/>
-              <a:t>9#:</a:t>
+              <a:t>‹#›</a:t>
             </a:fld>
             <a:endParaRPr lang="en-US"/>
           </a:p>
@@ -2828,7 +2828,7 @@
           <a:spcPct val="20000"/>
         </a:spcBef>
         <a:buFont charset="0" pitchFamily="34" typeface="Arial"/>
-        <a:buChar char="""/>
+        <a:buChar char="•"/>
         <a:defRPr kern="1200" sz="3200">
           <a:solidFill>
             <a:schemeClr val="tx1"/>
@@ -2843,7 +2843,7 @@
           <a:spcPct val="20000"/>
         </a:spcBef>
         <a:buFont charset="0" pitchFamily="34" typeface="Arial"/>
-        <a:buChar char=""/>
+        <a:buChar char="–"/>
         <a:defRPr kern="1200" sz="2800">
           <a:solidFill>
             <a:schemeClr val="tx1"/>
@@ -2858,7 +2858,7 @@
           <a:spcPct val="20000"/>
         </a:spcBef>
         <a:buFont charset="0" pitchFamily="34" typeface="Arial"/>
-        <a:buChar char="""/>
+        <a:buChar char="•"/>
         <a:defRPr kern="1200" sz="2400">
           <a:solidFill>
             <a:schemeClr val="tx1"/>
@@ -2873,7 +2873,7 @@
           <a:spcPct val="20000"/>
         </a:spcBef>
         <a:buFont charset="0" pitchFamily="34" typeface="Arial"/>
-        <a:buChar char=""/>
+        <a:buChar char="–"/>
         <a:defRPr kern="1200" sz="2000">
           <a:solidFill>
             <a:schemeClr val="tx1"/>
@@ -2888,7 +2888,7 @@
           <a:spcPct val="20000"/>
         </a:spcBef>
         <a:buFont charset="0" pitchFamily="34" typeface="Arial"/>
-        <a:buChar char="�"/>
+        <a:buChar char="»"/>
         <a:defRPr kern="1200" sz="2000">
           <a:solidFill>
             <a:schemeClr val="tx1"/>
@@ -2903,7 +2903,7 @@
           <a:spcPct val="20000"/>
         </a:spcBef>
         <a:buFont charset="0" pitchFamily="34" typeface="Arial"/>
-        <a:buChar char="""/>
+        <a:buChar char="•"/>
         <a:defRPr kern="1200" sz="2000">
           <a:solidFill>
             <a:schemeClr val="tx1"/>
@@ -2918,7 +2918,7 @@
           <a:spcPct val="20000"/>
         </a:spcBef>
         <a:buFont charset="0" pitchFamily="34" typeface="Arial"/>
-        <a:buChar char="""/>
+        <a:buChar char="•"/>
         <a:defRPr kern="1200" sz="2000">
           <a:solidFill>
             <a:schemeClr val="tx1"/>
@@ -2933,7 +2933,7 @@
           <a:spcPct val="20000"/>
         </a:spcBef>
         <a:buFont charset="0" pitchFamily="34" typeface="Arial"/>
-        <a:buChar char="""/>
+        <a:buChar char="•"/>
         <a:defRPr kern="1200" sz="2000">
           <a:solidFill>
             <a:schemeClr val="tx1"/>
@@ -2948,7 +2948,7 @@
           <a:spcPct val="20000"/>
         </a:spcBef>
         <a:buFont charset="0" pitchFamily="34" typeface="Arial"/>
-        <a:buChar char="""/>
+        <a:buChar char="•"/>
         <a:defRPr kern="1200" sz="2000">
           <a:solidFill>
             <a:schemeClr val="tx1"/>
@@ -3140,6 +3140,285 @@
 </p:sld>
 </file>
 
-<file path=ppt/theme/theme1.xml><?xml version="1.0" encoding="UTF-8" standalone="yes"?>
-<a:theme xmlns:a="http://schemas.openxmlformats.org/drawingml/2006/main" name="Office Theme"><a:themeElements><a:clrScheme name="Office"><a:dk1><a:sysClr val="windowText" lastClr="000000"/></a:dk1><a:lt1><a:sysClr val="window" lastClr="FFFFFF"/></a:lt1><a:dk2><a:srgbClr val="1F497D"/></a:dk2><a:lt2><a:srgbClr val="EEECE1"/></a:lt2><a:accent1><a:srgbClr val="4F81BD"/></a:accent1><a:accent2><a:srgbClr val="C0504D"/></a:accent2><a:accent3><a:srgbClr val="9BBB59"/></a:accent3><a:accent4><a:srgbClr val="8064A2"/></a:accent4><a:accent5><a:srgbClr val="4BACC6"/></a:accent5><a:accent6><a:srgbClr val="F79646"/></a:accent6><a:hlink><a:srgbClr val="0000FF"/></a:hlink><a:folHlink><a:srgbClr val="800080"/></a:folHlink></a:clrScheme><a:fontScheme name="Office"><a:majorFont><a:latin typeface="Calibri"/><a:ea typeface=""/><a:cs typeface=""/><a:font script="Jpan" typeface="-3 0��ï"/><a:font script="Hang" typeface="�@ �"/><a:font script="Hans" typeface="�S"/><a:font script="Hant" typeface="�0�"/><a:font script="Arab" typeface="Times New Roman"/><a:font script="Hebr" typeface="Times New Roman"/><a:font script="Thai" typeface="Angsana New"/><a:font script="Ethi" typeface="Nyala"/><a:font script="Beng" typeface="Vrinda"/><a:font script="Gujr" typeface="Shruti"/><a:font script="Khmr" typeface="MoolBoran"/><a:font script="Knda" typeface="Tunga"/><a:font script="Guru" typeface="Raavi"/><a:font script="Cans" typeface="Euphemia"/><a:font script="Cher" typeface="Plantagenet Cherokee"/><a:font script="Yiii" typeface="Microsoft Yi Baiti"/><a:font script="Tibt" typeface="Microsoft Himalaya"/><a:font script="Thaa" typeface="MV Boli"/><a:font script="Deva" typeface="Mangal"/><a:font script="Telu" typeface="Gautami"/><a:font script="Taml" typeface="Latha"/><a:font script="Syrc" typeface="Estrangelo Edessa"/><a:font script="Orya" typeface="Kalinga"/><a:font script="Mlym" typeface="Kartika"/><a:font script="Laoo" typeface="DokChampa"/><a:font script="Sinh" typeface="Iskoola Pota"/><a:font script="Mong" typeface="Mongolian Baiti"/><a:font script="Viet" typeface="Times New Roman"/><a:font script="Uigh" typeface="Microsoft Uighur"/></a:majorFont><a:minorFont><a:latin typeface="Calibri"/><a:ea typeface=""/><a:cs typeface=""/><a:font script="Jpan" typeface="-3 0��ï"/><a:font script="Hang" typeface="�@ �"/><a:font script="Hans" typeface="�S"/><a:font script="Hant" typeface="�0�"/><a:font script="Arab" typeface="Arial"/><a:font script="Hebr" typeface="Arial"/><a:font script="Thai" typeface="Cordia New"/><a:font script="Ethi" typeface="Nyala"/><a:font script="Beng" typeface="Vrinda"/><a:font script="Gujr" typeface="Shruti"/><a:font script="Khmr" typeface="DaunPenh"/><a:font script="Knda" typeface="Tunga"/><a:font script="Guru" typeface="Raavi"/><a:font script="Cans" typeface="Euphemia"/><a:font script="Cher" typeface="Plantagenet Cherokee"/><a:font script="Yiii" typeface="Microsoft Yi Baiti"/><a:font script="Tibt" typeface="Microsoft Himalaya"/><a:font script="Thaa" typeface="MV Boli"/><a:font script="Deva" typeface="Mangal"/><a:font script="Telu" typeface="Gautami"/><a:font script="Taml" typeface="Latha"/><a:font script="Syrc" typeface="Estrangelo Edessa"/><a:font script="Orya" typeface="Kalinga"/><a:font script="Mlym" typeface="Kartika"/><a:font script="Laoo" typeface="DokChampa"/><a:font script="Sinh" typeface="Iskoola Pota"/><a:font script="Mong" typeface="Mongolian Baiti"/><a:font script="Viet" typeface="Arial"/><a:font script="Uigh" typeface="Microsoft Uighur"/></a:minorFont></a:fontScheme><a:fmtScheme name="Office"><a:fillStyleLst><a:solidFill><a:schemeClr val="phClr"/></a:solidFill><a:gradFill rotWithShape="1"><a:gsLst><a:gs pos="0"><a:schemeClr val="phClr"><a:tint val="50000"/><a:satMod val="300000"/></a:schemeClr></a:gs><a:gs pos="35000"><a:schemeClr val="phClr"><a:tint val="37000"/><a:satMod val="300000"/></a:schemeClr></a:gs><a:gs pos="100000"><a:schemeClr val="phClr"><a:tint val="15000"/><a:satMod val="350000"/></a:schemeClr></a:gs></a:gsLst><a:lin ang="16200000" scaled="1"/></a:gradFill><a:gradFill rotWithShape="1"><a:gsLst><a:gs pos="0"><a:schemeClr val="phClr"><a:shade val="51000"/><a:satMod val="130000"/></a:schemeClr></a:gs><a:gs pos="80000"><a:schemeClr val="phClr"><a:shade val="93000"/><a:satMod val="130000"/></a:schemeClr></a:gs><a:gs pos="100000"><a:schemeClr val="phClr"><a:shade val="94000"/><a:satMod val="135000"/></a:schemeClr></a:gs></a:gsLst><a:lin ang="16200000" scaled="0"/></a:gradFill></a:fillStyleLst><a:lnStyleLst><a:ln w="9525" cap="flat" cmpd="sng" algn="ctr"><a:solidFill><a:schemeClr val="phClr"><a:shade val="95000"/><a:satMod val="105000"/></a:schemeClr></a:solidFill><a:prstDash val="solid"/></a:ln><a:ln w="25400" cap="flat" cmpd="sng" algn="ctr"><a:solidFill><a:schemeClr val="phClr"/></a:solidFill><a:prstDash val="solid"/></a:ln><a:ln w="38100" cap="flat" cmpd="sng" algn="ctr"><a:solidFill><a:schemeClr val="phClr"/></a:solidFill><a:prstDash val="solid"/></a:ln></a:lnStyleLst><a:effectStyleLst><a:effectStyle><a:effectLst><a:outerShdw blurRad="40000" dist="20000" dir="5400000" rotWithShape="0"><a:srgbClr val="000000"><a:alpha val="38000"/></a:srgbClr></a:outerShdw></a:effectLst></a:effectStyle><a:effectStyle><a:effectLst><a:outerShdw blurRad="40000" dist="23000" dir="5400000" rotWithShape="0"><a:srgbClr val="000000"><a:alpha val="35000"/></a:srgbClr></a:outerShdw></a:effectLst></a:effectStyle><a:effectStyle><a:effectLst><a:outerShdw blurRad="40000" dist="23000" dir="5400000" rotWithShape="0"><a:srgbClr val="000000"><a:alpha val="35000"/></a:srgbClr></a:outerShdw></a:effectLst><a:scene3d><a:camera prst="orthographicFront"><a:rot lat="0" lon="0" rev="0"/></a:camera><a:lightRig rig="threePt" dir="t"><a:rot lat="0" lon="0" rev="1200000"/></a:lightRig></a:scene3d><a:sp3d><a:bevelT w="63500" h="25400"/></a:sp3d></a:effectStyle></a:effectStyleLst><a:bgFillStyleLst><a:solidFill><a:schemeClr val="phClr"/></a:solidFill><a:gradFill rotWithShape="1"><a:gsLst><a:gs pos="0"><a:schemeClr val="phClr"><a:tint val="40000"/><a:satMod val="350000"/></a:schemeClr></a:gs><a:gs pos="40000"><a:schemeClr val="phClr"><a:tint val="45000"/><a:shade val="99000"/><a:satMod val="350000"/></a:schemeClr></a:gs><a:gs pos="100000"><a:schemeClr val="phClr"><a:shade val="20000"/><a:satMod val="255000"/></a:schemeClr></a:gs></a:gsLst><a:path path="circle"><a:fillToRect l="50000" t="-80000" r="50000" b="180000"/></a:path></a:gradFill><a:gradFill rotWithShape="1"><a:gsLst><a:gs pos="0"><a:schemeClr val="phClr"><a:tint val="80000"/><a:satMod val="300000"/></a:schemeClr></a:gs><a:gs pos="100000"><a:schemeClr val="phClr"><a:shade val="30000"/><a:satMod val="200000"/></a:schemeClr></a:gs></a:gsLst><a:path path="circle"><a:fillToRect l="50000" t="50000" r="50000" b="50000"/></a:path></a:gradFill></a:bgFillStyleLst></a:fmtScheme></a:themeElements><a:objectDefaults/><a:extraClrSchemeLst/></a:theme>
+<file path=ppt/theme/theme1.xml><?xml version="1.0" encoding="utf-8"?>
+<a:theme xmlns:a="http://schemas.openxmlformats.org/drawingml/2006/main" name="Office Theme">
+  <a:themeElements>
+    <a:clrScheme name="Office">
+      <a:dk1>
+        <a:sysClr val="windowText" lastClr="000000"/>
+      </a:dk1>
+      <a:lt1>
+        <a:sysClr val="window" lastClr="FFFFFF"/>
+      </a:lt1>
+      <a:dk2>
+        <a:srgbClr val="1F497D"/>
+      </a:dk2>
+      <a:lt2>
+        <a:srgbClr val="EEECE1"/>
+      </a:lt2>
+      <a:accent1>
+        <a:srgbClr val="4F81BD"/>
+      </a:accent1>
+      <a:accent2>
+        <a:srgbClr val="C0504D"/>
+      </a:accent2>
+      <a:accent3>
+        <a:srgbClr val="9BBB59"/>
+      </a:accent3>
+      <a:accent4>
+        <a:srgbClr val="8064A2"/>
+      </a:accent4>
+      <a:accent5>
+        <a:srgbClr val="4BACC6"/>
+      </a:accent5>
+      <a:accent6>
+        <a:srgbClr val="F79646"/>
+      </a:accent6>
+      <a:hlink>
+        <a:srgbClr val="0000FF"/>
+      </a:hlink>
+      <a:folHlink>
+        <a:srgbClr val="800080"/>
+      </a:folHlink>
+    </a:clrScheme>
+    <a:fontScheme name="Office">
+      <a:majorFont>
+        <a:latin typeface="Calibri"/>
+        <a:ea typeface=""/>
+        <a:cs typeface=""/>
+        <a:font script="Jpan" typeface="ＭＳ Ｐゴシック"/>
+        <a:font script="Hang" typeface="맑은 고딕"/>
+        <a:font script="Hans" typeface="宋体"/>
+        <a:font script="Hant" typeface="新細明體"/>
+        <a:font script="Arab" typeface="Times New Roman"/>
+        <a:font script="Hebr" typeface="Times New Roman"/>
+        <a:font script="Thai" typeface="Angsana New"/>
+        <a:font script="Ethi" typeface="Nyala"/>
+        <a:font script="Beng" typeface="Vrinda"/>
+        <a:font script="Gujr" typeface="Shruti"/>
+        <a:font script="Khmr" typeface="MoolBoran"/>
+        <a:font script="Knda" typeface="Tunga"/>
+        <a:font script="Guru" typeface="Raavi"/>
+        <a:font script="Cans" typeface="Euphemia"/>
+        <a:font script="Cher" typeface="Plantagenet Cherokee"/>
+        <a:font script="Yiii" typeface="Microsoft Yi Baiti"/>
+        <a:font script="Tibt" typeface="Microsoft Himalaya"/>
+        <a:font script="Thaa" typeface="MV Boli"/>
+        <a:font script="Deva" typeface="Mangal"/>
+        <a:font script="Telu" typeface="Gautami"/>
+        <a:font script="Taml" typeface="Latha"/>
+        <a:font script="Syrc" typeface="Estrangelo Edessa"/>
+        <a:font script="Orya" typeface="Kalinga"/>
+        <a:font script="Mlym" typeface="Kartika"/>
+        <a:font script="Laoo" typeface="DokChampa"/>
+        <a:font script="Sinh" typeface="Iskoola Pota"/>
+        <a:font script="Mong" typeface="Mongolian Baiti"/>
+        <a:font script="Viet" typeface="Times New Roman"/>
+        <a:font script="Uigh" typeface="Microsoft Uighur"/>
+      </a:majorFont>
+      <a:minorFont>
+        <a:latin typeface="Calibri"/>
+        <a:ea typeface=""/>
+        <a:cs typeface=""/>
+        <a:font script="Jpan" typeface="ＭＳ Ｐゴシック"/>
+        <a:font script="Hang" typeface="맑은 고딕"/>
+        <a:font script="Hans" typeface="宋体"/>
+        <a:font script="Hant" typeface="新細明體"/>
+        <a:font script="Arab" typeface="Arial"/>
+        <a:font script="Hebr" typeface="Arial"/>
+        <a:font script="Thai" typeface="Cordia New"/>
+        <a:font script="Ethi" typeface="Nyala"/>
+        <a:font script="Beng" typeface="Vrinda"/>
+        <a:font script="Gujr" typeface="Shruti"/>
+        <a:font script="Khmr" typeface="DaunPenh"/>
+        <a:font script="Knda" typeface="Tunga"/>
+        <a:font script="Guru" typeface="Raavi"/>
+        <a:font script="Cans" typeface="Euphemia"/>
+        <a:font script="Cher" typeface="Plantagenet Cherokee"/>
+        <a:font script="Yiii" typeface="Microsoft Yi Baiti"/>
+        <a:font script="Tibt" typeface="Microsoft Himalaya"/>
+        <a:font script="Thaa" typeface="MV Boli"/>
+        <a:font script="Deva" typeface="Mangal"/>
+        <a:font script="Telu" typeface="Gautami"/>
+        <a:font script="Taml" typeface="Latha"/>
+        <a:font script="Syrc" typeface="Estrangelo Edessa"/>
+        <a:font script="Orya" typeface="Kalinga"/>
+        <a:font script="Mlym" typeface="Kartika"/>
+        <a:font script="Laoo" typeface="DokChampa"/>
+        <a:font script="Sinh" typeface="Iskoola Pota"/>
+        <a:font script="Mong" typeface="Mongolian Baiti"/>
+        <a:font script="Viet" typeface="Arial"/>
+        <a:font script="Uigh" typeface="Microsoft Uighur"/>
+      </a:minorFont>
+    </a:fontScheme>
+    <a:fmtScheme name="Office">
+      <a:fillStyleLst>
+        <a:solidFill>
+          <a:schemeClr val="phClr"/>
+        </a:solidFill>
+        <a:gradFill rotWithShape="1">
+          <a:gsLst>
+            <a:gs pos="0">
+              <a:schemeClr val="phClr">
+                <a:tint val="50000"/>
+                <a:satMod val="300000"/>
+              </a:schemeClr>
+            </a:gs>
+            <a:gs pos="35000">
+              <a:schemeClr val="phClr">
+                <a:tint val="37000"/>
+                <a:satMod val="300000"/>
+              </a:schemeClr>
+            </a:gs>
+            <a:gs pos="100000">
+              <a:schemeClr val="phClr">
+                <a:tint val="15000"/>
+                <a:satMod val="350000"/>
+              </a:schemeClr>
+            </a:gs>
+          </a:gsLst>
+          <a:lin ang="16200000" scaled="1"/>
+        </a:gradFill>
+        <a:gradFill rotWithShape="1">
+          <a:gsLst>
+            <a:gs pos="0">
+              <a:schemeClr val="phClr">
+                <a:shade val="51000"/>
+                <a:satMod val="130000"/>
+              </a:schemeClr>
+            </a:gs>
+            <a:gs pos="80000">
+              <a:schemeClr val="phClr">
+                <a:shade val="93000"/>
+                <a:satMod val="130000"/>
+              </a:schemeClr>
+            </a:gs>
+            <a:gs pos="100000">
+              <a:schemeClr val="phClr">
+                <a:shade val="94000"/>
+                <a:satMod val="135000"/>
+              </a:schemeClr>
+            </a:gs>
+          </a:gsLst>
+          <a:lin ang="16200000" scaled="0"/>
+        </a:gradFill>
+      </a:fillStyleLst>
+      <a:lnStyleLst>
+        <a:ln w="9525" cap="flat" cmpd="sng" algn="ctr">
+          <a:solidFill>
+            <a:schemeClr val="phClr">
+              <a:shade val="95000"/>
+              <a:satMod val="105000"/>
+            </a:schemeClr>
+          </a:solidFill>
+          <a:prstDash val="solid"/>
+        </a:ln>
+        <a:ln w="25400" cap="flat" cmpd="sng" algn="ctr">
+          <a:solidFill>
+            <a:schemeClr val="phClr"/>
+          </a:solidFill>
+          <a:prstDash val="solid"/>
+        </a:ln>
+        <a:ln w="38100" cap="flat" cmpd="sng" algn="ctr">
+          <a:solidFill>
+            <a:schemeClr val="phClr"/>
+          </a:solidFill>
+          <a:prstDash val="solid"/>
+        </a:ln>
+      </a:lnStyleLst>
+      <a:effectStyleLst>
+        <a:effectStyle>
+          <a:effectLst>
+            <a:outerShdw blurRad="40000" dist="20000" dir="5400000" rotWithShape="0">
+              <a:srgbClr val="000000">
+                <a:alpha val="38000"/>
+              </a:srgbClr>
+            </a:outerShdw>
+          </a:effectLst>
+        </a:effectStyle>
+        <a:effectStyle>
+          <a:effectLst>
+            <a:outerShdw blurRad="40000" dist="23000" dir="5400000" rotWithShape="0">
+              <a:srgbClr val="000000">
+                <a:alpha val="35000"/>
+              </a:srgbClr>
+            </a:outerShdw>
+          </a:effectLst>
+        </a:effectStyle>
+        <a:effectStyle>
+          <a:effectLst>
+            <a:outerShdw blurRad="40000" dist="23000" dir="5400000" rotWithShape="0">
+              <a:srgbClr val="000000">
+                <a:alpha val="35000"/>
+              </a:srgbClr>
+            </a:outerShdw>
+          </a:effectLst>
+          <a:scene3d>
+            <a:camera prst="orthographicFront">
+              <a:rot lat="0" lon="0" rev="0"/>
+            </a:camera>
+            <a:lightRig rig="threePt" dir="t">
+              <a:rot lat="0" lon="0" rev="1200000"/>
+            </a:lightRig>
+          </a:scene3d>
+          <a:sp3d>
+            <a:bevelT w="63500" h="25400"/>
+          </a:sp3d>
+        </a:effectStyle>
+      </a:effectStyleLst>
+      <a:bgFillStyleLst>
+        <a:solidFill>
+          <a:schemeClr val="phClr"/>
+        </a:solidFill>
+        <a:gradFill rotWithShape="1">
+          <a:gsLst>
+            <a:gs pos="0">
+              <a:schemeClr val="phClr">
+                <a:tint val="40000"/>
+                <a:satMod val="350000"/>
+              </a:schemeClr>
+            </a:gs>
+            <a:gs pos="40000">
+              <a:schemeClr val="phClr">
+                <a:tint val="45000"/>
+                <a:shade val="99000"/>
+                <a:satMod val="350000"/>
+              </a:schemeClr>
+            </a:gs>
+            <a:gs pos="100000">
+              <a:schemeClr val="phClr">
+                <a:shade val="20000"/>
+                <a:satMod val="255000"/>
+              </a:schemeClr>
+            </a:gs>
+          </a:gsLst>
+          <a:path path="circle">
+            <a:fillToRect l="50000" t="-80000" r="50000" b="180000"/>
+          </a:path>
+        </a:gradFill>
+        <a:gradFill rotWithShape="1">
+          <a:gsLst>
+            <a:gs pos="0">
+              <a:schemeClr val="phClr">
+                <a:tint val="80000"/>
+                <a:satMod val="300000"/>
+              </a:schemeClr>
+            </a:gs>
+            <a:gs pos="100000">
+              <a:schemeClr val="phClr">
+                <a:shade val="30000"/>
+                <a:satMod val="200000"/>
+              </a:schemeClr>
+            </a:gs>
+          </a:gsLst>
+          <a:path path="circle">
+            <a:fillToRect l="50000" t="50000" r="50000" b="50000"/>
+          </a:path>
+        </a:gradFill>
+      </a:bgFillStyleLst>
+    </a:fmtScheme>
+  </a:themeElements>
+  <a:objectDefaults/>
+  <a:extraClrSchemeLst/>
+</a:theme>
 </file>
</xml_diff>